<commit_message>
[update]: added original ppt file
</commit_message>
<xml_diff>
--- a/resources/archi_dia.pptx
+++ b/resources/archi_dia.pptx
@@ -243,7 +243,7 @@
           <a:p>
             <a:fld id="{C96C6191-6529-4A24-8B4F-BDE3F14A676C}" type="datetimeFigureOut">
               <a:rPr lang="ko-KR" altLang="en-US" smtClean="0"/>
-              <a:t>2023-11-16</a:t>
+              <a:t>2023-11-22</a:t>
             </a:fld>
             <a:endParaRPr lang="ko-KR" altLang="en-US"/>
           </a:p>
@@ -413,7 +413,7 @@
           <a:p>
             <a:fld id="{C96C6191-6529-4A24-8B4F-BDE3F14A676C}" type="datetimeFigureOut">
               <a:rPr lang="ko-KR" altLang="en-US" smtClean="0"/>
-              <a:t>2023-11-16</a:t>
+              <a:t>2023-11-22</a:t>
             </a:fld>
             <a:endParaRPr lang="ko-KR" altLang="en-US"/>
           </a:p>
@@ -593,7 +593,7 @@
           <a:p>
             <a:fld id="{C96C6191-6529-4A24-8B4F-BDE3F14A676C}" type="datetimeFigureOut">
               <a:rPr lang="ko-KR" altLang="en-US" smtClean="0"/>
-              <a:t>2023-11-16</a:t>
+              <a:t>2023-11-22</a:t>
             </a:fld>
             <a:endParaRPr lang="ko-KR" altLang="en-US"/>
           </a:p>
@@ -763,7 +763,7 @@
           <a:p>
             <a:fld id="{C96C6191-6529-4A24-8B4F-BDE3F14A676C}" type="datetimeFigureOut">
               <a:rPr lang="ko-KR" altLang="en-US" smtClean="0"/>
-              <a:t>2023-11-16</a:t>
+              <a:t>2023-11-22</a:t>
             </a:fld>
             <a:endParaRPr lang="ko-KR" altLang="en-US"/>
           </a:p>
@@ -1009,7 +1009,7 @@
           <a:p>
             <a:fld id="{C96C6191-6529-4A24-8B4F-BDE3F14A676C}" type="datetimeFigureOut">
               <a:rPr lang="ko-KR" altLang="en-US" smtClean="0"/>
-              <a:t>2023-11-16</a:t>
+              <a:t>2023-11-22</a:t>
             </a:fld>
             <a:endParaRPr lang="ko-KR" altLang="en-US"/>
           </a:p>
@@ -1241,7 +1241,7 @@
           <a:p>
             <a:fld id="{C96C6191-6529-4A24-8B4F-BDE3F14A676C}" type="datetimeFigureOut">
               <a:rPr lang="ko-KR" altLang="en-US" smtClean="0"/>
-              <a:t>2023-11-16</a:t>
+              <a:t>2023-11-22</a:t>
             </a:fld>
             <a:endParaRPr lang="ko-KR" altLang="en-US"/>
           </a:p>
@@ -1608,7 +1608,7 @@
           <a:p>
             <a:fld id="{C96C6191-6529-4A24-8B4F-BDE3F14A676C}" type="datetimeFigureOut">
               <a:rPr lang="ko-KR" altLang="en-US" smtClean="0"/>
-              <a:t>2023-11-16</a:t>
+              <a:t>2023-11-22</a:t>
             </a:fld>
             <a:endParaRPr lang="ko-KR" altLang="en-US"/>
           </a:p>
@@ -1726,7 +1726,7 @@
           <a:p>
             <a:fld id="{C96C6191-6529-4A24-8B4F-BDE3F14A676C}" type="datetimeFigureOut">
               <a:rPr lang="ko-KR" altLang="en-US" smtClean="0"/>
-              <a:t>2023-11-16</a:t>
+              <a:t>2023-11-22</a:t>
             </a:fld>
             <a:endParaRPr lang="ko-KR" altLang="en-US"/>
           </a:p>
@@ -1821,7 +1821,7 @@
           <a:p>
             <a:fld id="{C96C6191-6529-4A24-8B4F-BDE3F14A676C}" type="datetimeFigureOut">
               <a:rPr lang="ko-KR" altLang="en-US" smtClean="0"/>
-              <a:t>2023-11-16</a:t>
+              <a:t>2023-11-22</a:t>
             </a:fld>
             <a:endParaRPr lang="ko-KR" altLang="en-US"/>
           </a:p>
@@ -2098,7 +2098,7 @@
           <a:p>
             <a:fld id="{C96C6191-6529-4A24-8B4F-BDE3F14A676C}" type="datetimeFigureOut">
               <a:rPr lang="ko-KR" altLang="en-US" smtClean="0"/>
-              <a:t>2023-11-16</a:t>
+              <a:t>2023-11-22</a:t>
             </a:fld>
             <a:endParaRPr lang="ko-KR" altLang="en-US"/>
           </a:p>
@@ -2351,7 +2351,7 @@
           <a:p>
             <a:fld id="{C96C6191-6529-4A24-8B4F-BDE3F14A676C}" type="datetimeFigureOut">
               <a:rPr lang="ko-KR" altLang="en-US" smtClean="0"/>
-              <a:t>2023-11-16</a:t>
+              <a:t>2023-11-22</a:t>
             </a:fld>
             <a:endParaRPr lang="ko-KR" altLang="en-US"/>
           </a:p>
@@ -2564,7 +2564,7 @@
           <a:p>
             <a:fld id="{C96C6191-6529-4A24-8B4F-BDE3F14A676C}" type="datetimeFigureOut">
               <a:rPr lang="ko-KR" altLang="en-US" smtClean="0"/>
-              <a:t>2023-11-16</a:t>
+              <a:t>2023-11-22</a:t>
             </a:fld>
             <a:endParaRPr lang="ko-KR" altLang="en-US"/>
           </a:p>
@@ -2977,13 +2977,18 @@
         </p:nvSpPr>
         <p:spPr>
           <a:xfrm>
-            <a:off x="4928944" y="739967"/>
+            <a:off x="4513307" y="623589"/>
             <a:ext cx="6501056" cy="5728068"/>
           </a:xfrm>
           <a:prstGeom prst="roundRect">
             <a:avLst/>
           </a:prstGeom>
           <a:noFill/>
+          <a:ln>
+            <a:solidFill>
+              <a:schemeClr val="tx1"/>
+            </a:solidFill>
+          </a:ln>
         </p:spPr>
         <p:style>
           <a:lnRef idx="2">
@@ -3020,7 +3025,7 @@
         </p:nvSpPr>
         <p:spPr bwMode="auto">
           <a:xfrm>
-            <a:off x="155575" y="-144463"/>
+            <a:off x="-260062" y="-260841"/>
             <a:ext cx="2988458" cy="2988468"/>
           </a:xfrm>
           <a:prstGeom prst="rect">
@@ -3071,7 +3076,7 @@
         </p:blipFill>
         <p:spPr>
           <a:xfrm>
-            <a:off x="6127950" y="5358328"/>
+            <a:off x="5712313" y="5241950"/>
             <a:ext cx="841219" cy="841219"/>
           </a:xfrm>
           <a:prstGeom prst="rect">
@@ -3101,7 +3106,7 @@
         </p:blipFill>
         <p:spPr>
           <a:xfrm>
-            <a:off x="983358" y="2636185"/>
+            <a:off x="567721" y="2519807"/>
             <a:ext cx="1320631" cy="990473"/>
           </a:xfrm>
           <a:prstGeom prst="rect">
@@ -3132,7 +3137,7 @@
         </p:blipFill>
         <p:spPr bwMode="auto">
           <a:xfrm>
-            <a:off x="3858579" y="2662610"/>
+            <a:off x="3442942" y="2546232"/>
             <a:ext cx="1171143" cy="937625"/>
           </a:xfrm>
           <a:prstGeom prst="rect">
@@ -3172,7 +3177,7 @@
         </p:blipFill>
         <p:spPr>
           <a:xfrm>
-            <a:off x="6141967" y="3919058"/>
+            <a:off x="5726330" y="3802680"/>
             <a:ext cx="841219" cy="841219"/>
           </a:xfrm>
           <a:prstGeom prst="rect">
@@ -3202,7 +3207,7 @@
         </p:blipFill>
         <p:spPr>
           <a:xfrm>
-            <a:off x="6127949" y="1098597"/>
+            <a:off x="5712312" y="982219"/>
             <a:ext cx="841219" cy="841219"/>
           </a:xfrm>
           <a:prstGeom prst="rect">
@@ -3232,7 +3237,7 @@
         </p:blipFill>
         <p:spPr>
           <a:xfrm>
-            <a:off x="6100087" y="2458796"/>
+            <a:off x="5684450" y="2342418"/>
             <a:ext cx="841219" cy="841219"/>
           </a:xfrm>
           <a:prstGeom prst="rect">
@@ -3262,7 +3267,7 @@
         </p:blipFill>
         <p:spPr>
           <a:xfrm>
-            <a:off x="8344243" y="1206708"/>
+            <a:off x="7928606" y="1090330"/>
             <a:ext cx="901437" cy="624996"/>
           </a:xfrm>
           <a:prstGeom prst="rect">
@@ -3292,7 +3297,7 @@
         </p:blipFill>
         <p:spPr>
           <a:xfrm>
-            <a:off x="8466473" y="2566907"/>
+            <a:off x="8050836" y="2450529"/>
             <a:ext cx="901437" cy="624996"/>
           </a:xfrm>
           <a:prstGeom prst="rect">
@@ -3322,7 +3327,7 @@
         </p:blipFill>
         <p:spPr>
           <a:xfrm>
-            <a:off x="9899998" y="3229402"/>
+            <a:off x="9763788" y="3313973"/>
             <a:ext cx="1831162" cy="610387"/>
           </a:xfrm>
           <a:prstGeom prst="rect">
@@ -3352,7 +3357,7 @@
         </p:blipFill>
         <p:spPr>
           <a:xfrm>
-            <a:off x="8561432" y="5105924"/>
+            <a:off x="8145795" y="4989546"/>
             <a:ext cx="609419" cy="422530"/>
           </a:xfrm>
           <a:prstGeom prst="rect">
@@ -3382,7 +3387,7 @@
         </p:blipFill>
         <p:spPr>
           <a:xfrm>
-            <a:off x="8374325" y="5940913"/>
+            <a:off x="7958688" y="5824535"/>
             <a:ext cx="983632" cy="327877"/>
           </a:xfrm>
           <a:prstGeom prst="rect">
@@ -3401,13 +3406,16 @@
         </p:nvCxnSpPr>
         <p:spPr>
           <a:xfrm flipV="1">
-            <a:off x="5029722" y="1519207"/>
+            <a:off x="4614085" y="1402829"/>
             <a:ext cx="1098227" cy="1612216"/>
           </a:xfrm>
           <a:prstGeom prst="bentConnector3">
             <a:avLst/>
           </a:prstGeom>
           <a:ln>
+            <a:solidFill>
+              <a:schemeClr val="tx1"/>
+            </a:solidFill>
             <a:tailEnd type="triangle"/>
           </a:ln>
         </p:spPr>
@@ -3437,7 +3445,7 @@
         </p:nvCxnSpPr>
         <p:spPr>
           <a:xfrm flipV="1">
-            <a:off x="5029722" y="2879406"/>
+            <a:off x="4614085" y="2763028"/>
             <a:ext cx="1070365" cy="252017"/>
           </a:xfrm>
           <a:prstGeom prst="bentConnector3">
@@ -3446,42 +3454,9 @@
             </a:avLst>
           </a:prstGeom>
           <a:ln>
-            <a:tailEnd type="triangle"/>
-          </a:ln>
-        </p:spPr>
-        <p:style>
-          <a:lnRef idx="1">
-            <a:schemeClr val="accent1"/>
-          </a:lnRef>
-          <a:fillRef idx="0">
-            <a:schemeClr val="accent1"/>
-          </a:fillRef>
-          <a:effectRef idx="0">
-            <a:schemeClr val="accent1"/>
-          </a:effectRef>
-          <a:fontRef idx="minor">
-            <a:schemeClr val="tx1"/>
-          </a:fontRef>
-        </p:style>
-      </p:cxnSp>
-      <p:cxnSp>
-        <p:nvCxnSpPr>
-          <p:cNvPr id="26" name="꺾인 연결선 25"/>
-          <p:cNvCxnSpPr>
-            <a:stCxn id="1030" idx="3"/>
-            <a:endCxn id="12" idx="1"/>
-          </p:cNvCxnSpPr>
-          <p:nvPr/>
-        </p:nvCxnSpPr>
-        <p:spPr>
-          <a:xfrm>
-            <a:off x="5029722" y="3131423"/>
-            <a:ext cx="1112245" cy="1208245"/>
-          </a:xfrm>
-          <a:prstGeom prst="bentConnector3">
-            <a:avLst/>
-          </a:prstGeom>
-          <a:ln>
+            <a:solidFill>
+              <a:schemeClr val="tx1"/>
+            </a:solidFill>
             <a:tailEnd type="triangle"/>
           </a:ln>
         </p:spPr>
@@ -3511,13 +3486,16 @@
         </p:nvCxnSpPr>
         <p:spPr>
           <a:xfrm>
-            <a:off x="5029722" y="3131423"/>
+            <a:off x="4614085" y="3015045"/>
             <a:ext cx="1098228" cy="2647515"/>
           </a:xfrm>
           <a:prstGeom prst="bentConnector3">
             <a:avLst/>
           </a:prstGeom>
           <a:ln>
+            <a:solidFill>
+              <a:schemeClr val="tx1"/>
+            </a:solidFill>
             <a:tailEnd type="triangle"/>
           </a:ln>
         </p:spPr>
@@ -3547,13 +3525,16 @@
         </p:nvCxnSpPr>
         <p:spPr>
           <a:xfrm flipV="1">
-            <a:off x="6969168" y="1519206"/>
+            <a:off x="6553531" y="1402828"/>
             <a:ext cx="1375075" cy="1"/>
           </a:xfrm>
           <a:prstGeom prst="straightConnector1">
             <a:avLst/>
           </a:prstGeom>
           <a:ln>
+            <a:solidFill>
+              <a:schemeClr val="tx1"/>
+            </a:solidFill>
             <a:tailEnd type="triangle"/>
           </a:ln>
         </p:spPr>
@@ -3583,48 +3564,16 @@
         </p:nvCxnSpPr>
         <p:spPr>
           <a:xfrm flipV="1">
-            <a:off x="6941306" y="2879405"/>
+            <a:off x="6525669" y="2763027"/>
             <a:ext cx="1525167" cy="1"/>
           </a:xfrm>
           <a:prstGeom prst="straightConnector1">
             <a:avLst/>
           </a:prstGeom>
           <a:ln>
-            <a:tailEnd type="triangle"/>
-          </a:ln>
-        </p:spPr>
-        <p:style>
-          <a:lnRef idx="1">
-            <a:schemeClr val="accent1"/>
-          </a:lnRef>
-          <a:fillRef idx="0">
-            <a:schemeClr val="accent1"/>
-          </a:fillRef>
-          <a:effectRef idx="0">
-            <a:schemeClr val="accent1"/>
-          </a:effectRef>
-          <a:fontRef idx="minor">
-            <a:schemeClr val="tx1"/>
-          </a:fontRef>
-        </p:style>
-      </p:cxnSp>
-      <p:cxnSp>
-        <p:nvCxnSpPr>
-          <p:cNvPr id="36" name="직선 화살표 연결선 35"/>
-          <p:cNvCxnSpPr>
-            <a:stCxn id="12" idx="3"/>
-          </p:cNvCxnSpPr>
-          <p:nvPr/>
-        </p:nvCxnSpPr>
-        <p:spPr>
-          <a:xfrm flipV="1">
-            <a:off x="6983186" y="4335880"/>
-            <a:ext cx="1441047" cy="3788"/>
-          </a:xfrm>
-          <a:prstGeom prst="straightConnector1">
-            <a:avLst/>
-          </a:prstGeom>
-          <a:ln>
+            <a:solidFill>
+              <a:schemeClr val="tx1"/>
+            </a:solidFill>
             <a:tailEnd type="triangle"/>
           </a:ln>
         </p:spPr>
@@ -3654,13 +3603,16 @@
         </p:nvCxnSpPr>
         <p:spPr>
           <a:xfrm flipV="1">
-            <a:off x="6969169" y="5317189"/>
+            <a:off x="6553532" y="5200811"/>
             <a:ext cx="1592263" cy="461749"/>
           </a:xfrm>
           <a:prstGeom prst="bentConnector3">
             <a:avLst/>
           </a:prstGeom>
           <a:ln>
+            <a:solidFill>
+              <a:schemeClr val="tx1"/>
+            </a:solidFill>
             <a:tailEnd type="triangle"/>
           </a:ln>
         </p:spPr>
@@ -3690,7 +3642,7 @@
         </p:nvCxnSpPr>
         <p:spPr>
           <a:xfrm>
-            <a:off x="6969169" y="5778938"/>
+            <a:off x="6553532" y="5662560"/>
             <a:ext cx="1405156" cy="325914"/>
           </a:xfrm>
           <a:prstGeom prst="bentConnector3">
@@ -3699,6 +3651,9 @@
             </a:avLst>
           </a:prstGeom>
           <a:ln>
+            <a:solidFill>
+              <a:schemeClr val="tx1"/>
+            </a:solidFill>
             <a:tailEnd type="triangle"/>
           </a:ln>
         </p:spPr>
@@ -3728,13 +3683,362 @@
         </p:nvCxnSpPr>
         <p:spPr>
           <a:xfrm>
-            <a:off x="2303989" y="3131422"/>
+            <a:off x="1888352" y="3015044"/>
             <a:ext cx="1554590" cy="1"/>
           </a:xfrm>
           <a:prstGeom prst="straightConnector1">
             <a:avLst/>
           </a:prstGeom>
           <a:ln>
+            <a:solidFill>
+              <a:schemeClr val="tx1"/>
+            </a:solidFill>
+            <a:tailEnd type="triangle"/>
+          </a:ln>
+        </p:spPr>
+        <p:style>
+          <a:lnRef idx="1">
+            <a:schemeClr val="accent1"/>
+          </a:lnRef>
+          <a:fillRef idx="0">
+            <a:schemeClr val="accent1"/>
+          </a:fillRef>
+          <a:effectRef idx="0">
+            <a:schemeClr val="accent1"/>
+          </a:effectRef>
+          <a:fontRef idx="minor">
+            <a:schemeClr val="tx1"/>
+          </a:fontRef>
+        </p:style>
+      </p:cxnSp>
+      <p:sp>
+        <p:nvSpPr>
+          <p:cNvPr id="2" name="TextBox 1"/>
+          <p:cNvSpPr txBox="1"/>
+          <p:nvPr/>
+        </p:nvSpPr>
+        <p:spPr>
+          <a:xfrm>
+            <a:off x="3110469" y="3505240"/>
+            <a:ext cx="1886989" cy="323165"/>
+          </a:xfrm>
+          <a:prstGeom prst="rect">
+            <a:avLst/>
+          </a:prstGeom>
+          <a:noFill/>
+        </p:spPr>
+        <p:txBody>
+          <a:bodyPr wrap="square" rtlCol="0">
+            <a:spAutoFit/>
+          </a:bodyPr>
+          <a:lstStyle/>
+          <a:p>
+            <a:pPr algn="ctr"/>
+            <a:r>
+              <a:rPr lang="en-US" altLang="ko-KR" sz="1500" dirty="0" smtClean="0">
+                <a:latin typeface="Pretendard Black" panose="02000A03000000020004" pitchFamily="2" charset="-127"/>
+                <a:ea typeface="Pretendard Black" panose="02000A03000000020004" pitchFamily="2" charset="-127"/>
+                <a:cs typeface="Pretendard Black" panose="02000A03000000020004" pitchFamily="2" charset="-127"/>
+              </a:rPr>
+              <a:t>Gateway</a:t>
+            </a:r>
+            <a:endParaRPr lang="ko-KR" altLang="en-US" sz="1500" dirty="0">
+              <a:latin typeface="Pretendard Black" panose="02000A03000000020004" pitchFamily="2" charset="-127"/>
+              <a:ea typeface="Pretendard Black" panose="02000A03000000020004" pitchFamily="2" charset="-127"/>
+              <a:cs typeface="Pretendard Black" panose="02000A03000000020004" pitchFamily="2" charset="-127"/>
+            </a:endParaRPr>
+          </a:p>
+        </p:txBody>
+      </p:sp>
+      <p:sp>
+        <p:nvSpPr>
+          <p:cNvPr id="29" name="TextBox 28"/>
+          <p:cNvSpPr txBox="1"/>
+          <p:nvPr/>
+        </p:nvSpPr>
+        <p:spPr>
+          <a:xfrm>
+            <a:off x="6544190" y="2869338"/>
+            <a:ext cx="2684416" cy="553998"/>
+          </a:xfrm>
+          <a:prstGeom prst="rect">
+            <a:avLst/>
+          </a:prstGeom>
+          <a:noFill/>
+        </p:spPr>
+        <p:txBody>
+          <a:bodyPr wrap="square" rtlCol="0">
+            <a:spAutoFit/>
+          </a:bodyPr>
+          <a:lstStyle/>
+          <a:p>
+            <a:r>
+              <a:rPr lang="en-US" altLang="ko-KR" sz="1500" dirty="0" smtClean="0">
+                <a:latin typeface="Pretendard Black" panose="02000A03000000020004" pitchFamily="2" charset="-127"/>
+                <a:ea typeface="Pretendard Black" panose="02000A03000000020004" pitchFamily="2" charset="-127"/>
+                <a:cs typeface="Pretendard Black" panose="02000A03000000020004" pitchFamily="2" charset="-127"/>
+              </a:rPr>
+              <a:t>User </a:t>
+            </a:r>
+          </a:p>
+          <a:p>
+            <a:r>
+              <a:rPr lang="en-US" altLang="ko-KR" sz="1500" dirty="0" smtClean="0">
+                <a:latin typeface="Pretendard Black" panose="02000A03000000020004" pitchFamily="2" charset="-127"/>
+                <a:ea typeface="Pretendard Black" panose="02000A03000000020004" pitchFamily="2" charset="-127"/>
+                <a:cs typeface="Pretendard Black" panose="02000A03000000020004" pitchFamily="2" charset="-127"/>
+              </a:rPr>
+              <a:t>Service</a:t>
+            </a:r>
+            <a:endParaRPr lang="ko-KR" altLang="en-US" sz="1500" dirty="0">
+              <a:latin typeface="Pretendard Black" panose="02000A03000000020004" pitchFamily="2" charset="-127"/>
+              <a:ea typeface="Pretendard Black" panose="02000A03000000020004" pitchFamily="2" charset="-127"/>
+              <a:cs typeface="Pretendard Black" panose="02000A03000000020004" pitchFamily="2" charset="-127"/>
+            </a:endParaRPr>
+          </a:p>
+        </p:txBody>
+      </p:sp>
+      <p:sp>
+        <p:nvSpPr>
+          <p:cNvPr id="30" name="TextBox 29"/>
+          <p:cNvSpPr txBox="1"/>
+          <p:nvPr/>
+        </p:nvSpPr>
+        <p:spPr>
+          <a:xfrm>
+            <a:off x="6553531" y="1566833"/>
+            <a:ext cx="2684416" cy="553998"/>
+          </a:xfrm>
+          <a:prstGeom prst="rect">
+            <a:avLst/>
+          </a:prstGeom>
+          <a:noFill/>
+        </p:spPr>
+        <p:txBody>
+          <a:bodyPr wrap="square" rtlCol="0">
+            <a:spAutoFit/>
+          </a:bodyPr>
+          <a:lstStyle/>
+          <a:p>
+            <a:r>
+              <a:rPr lang="en-US" altLang="ko-KR" sz="1500" dirty="0" smtClean="0">
+                <a:latin typeface="Pretendard Black" panose="02000A03000000020004" pitchFamily="2" charset="-127"/>
+                <a:ea typeface="Pretendard Black" panose="02000A03000000020004" pitchFamily="2" charset="-127"/>
+                <a:cs typeface="Pretendard Black" panose="02000A03000000020004" pitchFamily="2" charset="-127"/>
+              </a:rPr>
+              <a:t>Community </a:t>
+            </a:r>
+          </a:p>
+          <a:p>
+            <a:r>
+              <a:rPr lang="en-US" altLang="ko-KR" sz="1500" dirty="0" smtClean="0">
+                <a:latin typeface="Pretendard Black" panose="02000A03000000020004" pitchFamily="2" charset="-127"/>
+                <a:ea typeface="Pretendard Black" panose="02000A03000000020004" pitchFamily="2" charset="-127"/>
+                <a:cs typeface="Pretendard Black" panose="02000A03000000020004" pitchFamily="2" charset="-127"/>
+              </a:rPr>
+              <a:t>Service</a:t>
+            </a:r>
+            <a:endParaRPr lang="ko-KR" altLang="en-US" sz="1500" dirty="0">
+              <a:latin typeface="Pretendard Black" panose="02000A03000000020004" pitchFamily="2" charset="-127"/>
+              <a:ea typeface="Pretendard Black" panose="02000A03000000020004" pitchFamily="2" charset="-127"/>
+              <a:cs typeface="Pretendard Black" panose="02000A03000000020004" pitchFamily="2" charset="-127"/>
+            </a:endParaRPr>
+          </a:p>
+        </p:txBody>
+      </p:sp>
+      <p:sp>
+        <p:nvSpPr>
+          <p:cNvPr id="32" name="TextBox 31"/>
+          <p:cNvSpPr txBox="1"/>
+          <p:nvPr/>
+        </p:nvSpPr>
+        <p:spPr>
+          <a:xfrm>
+            <a:off x="6553531" y="5733372"/>
+            <a:ext cx="2684416" cy="553998"/>
+          </a:xfrm>
+          <a:prstGeom prst="rect">
+            <a:avLst/>
+          </a:prstGeom>
+          <a:noFill/>
+        </p:spPr>
+        <p:txBody>
+          <a:bodyPr wrap="square" rtlCol="0">
+            <a:spAutoFit/>
+          </a:bodyPr>
+          <a:lstStyle/>
+          <a:p>
+            <a:r>
+              <a:rPr lang="en-US" altLang="ko-KR" sz="1500" dirty="0" smtClean="0">
+                <a:latin typeface="Pretendard Black" panose="02000A03000000020004" pitchFamily="2" charset="-127"/>
+                <a:ea typeface="Pretendard Black" panose="02000A03000000020004" pitchFamily="2" charset="-127"/>
+                <a:cs typeface="Pretendard Black" panose="02000A03000000020004" pitchFamily="2" charset="-127"/>
+              </a:rPr>
+              <a:t>Location</a:t>
+            </a:r>
+          </a:p>
+          <a:p>
+            <a:r>
+              <a:rPr lang="en-US" altLang="ko-KR" sz="1500" dirty="0" smtClean="0">
+                <a:latin typeface="Pretendard Black" panose="02000A03000000020004" pitchFamily="2" charset="-127"/>
+                <a:ea typeface="Pretendard Black" panose="02000A03000000020004" pitchFamily="2" charset="-127"/>
+                <a:cs typeface="Pretendard Black" panose="02000A03000000020004" pitchFamily="2" charset="-127"/>
+              </a:rPr>
+              <a:t>Service</a:t>
+            </a:r>
+            <a:endParaRPr lang="ko-KR" altLang="en-US" sz="1500" dirty="0">
+              <a:latin typeface="Pretendard Black" panose="02000A03000000020004" pitchFamily="2" charset="-127"/>
+              <a:ea typeface="Pretendard Black" panose="02000A03000000020004" pitchFamily="2" charset="-127"/>
+              <a:cs typeface="Pretendard Black" panose="02000A03000000020004" pitchFamily="2" charset="-127"/>
+            </a:endParaRPr>
+          </a:p>
+        </p:txBody>
+      </p:sp>
+      <p:sp>
+        <p:nvSpPr>
+          <p:cNvPr id="33" name="TextBox 32"/>
+          <p:cNvSpPr txBox="1"/>
+          <p:nvPr/>
+        </p:nvSpPr>
+        <p:spPr>
+          <a:xfrm>
+            <a:off x="6581566" y="4307680"/>
+            <a:ext cx="2684416" cy="553998"/>
+          </a:xfrm>
+          <a:prstGeom prst="rect">
+            <a:avLst/>
+          </a:prstGeom>
+          <a:noFill/>
+        </p:spPr>
+        <p:txBody>
+          <a:bodyPr wrap="square" rtlCol="0">
+            <a:spAutoFit/>
+          </a:bodyPr>
+          <a:lstStyle/>
+          <a:p>
+            <a:r>
+              <a:rPr lang="en-US" altLang="ko-KR" sz="1500" dirty="0" smtClean="0">
+                <a:latin typeface="Pretendard Black" panose="02000A03000000020004" pitchFamily="2" charset="-127"/>
+                <a:ea typeface="Pretendard Black" panose="02000A03000000020004" pitchFamily="2" charset="-127"/>
+                <a:cs typeface="Pretendard Black" panose="02000A03000000020004" pitchFamily="2" charset="-127"/>
+              </a:rPr>
+              <a:t>Chat</a:t>
+            </a:r>
+          </a:p>
+          <a:p>
+            <a:r>
+              <a:rPr lang="en-US" altLang="ko-KR" sz="1500" dirty="0" smtClean="0">
+                <a:latin typeface="Pretendard Black" panose="02000A03000000020004" pitchFamily="2" charset="-127"/>
+                <a:ea typeface="Pretendard Black" panose="02000A03000000020004" pitchFamily="2" charset="-127"/>
+                <a:cs typeface="Pretendard Black" panose="02000A03000000020004" pitchFamily="2" charset="-127"/>
+              </a:rPr>
+              <a:t>Service</a:t>
+            </a:r>
+            <a:endParaRPr lang="ko-KR" altLang="en-US" sz="1500" dirty="0">
+              <a:latin typeface="Pretendard Black" panose="02000A03000000020004" pitchFamily="2" charset="-127"/>
+              <a:ea typeface="Pretendard Black" panose="02000A03000000020004" pitchFamily="2" charset="-127"/>
+              <a:cs typeface="Pretendard Black" panose="02000A03000000020004" pitchFamily="2" charset="-127"/>
+            </a:endParaRPr>
+          </a:p>
+        </p:txBody>
+      </p:sp>
+      <p:cxnSp>
+        <p:nvCxnSpPr>
+          <p:cNvPr id="19" name="직선 화살표 연결선 18"/>
+          <p:cNvCxnSpPr>
+            <a:endCxn id="12" idx="1"/>
+          </p:cNvCxnSpPr>
+          <p:nvPr/>
+        </p:nvCxnSpPr>
+        <p:spPr>
+          <a:xfrm>
+            <a:off x="5163198" y="4212794"/>
+            <a:ext cx="563132" cy="10496"/>
+          </a:xfrm>
+          <a:prstGeom prst="straightConnector1">
+            <a:avLst/>
+          </a:prstGeom>
+          <a:ln>
+            <a:solidFill>
+              <a:schemeClr val="tx1"/>
+            </a:solidFill>
+            <a:tailEnd type="triangle"/>
+          </a:ln>
+        </p:spPr>
+        <p:style>
+          <a:lnRef idx="1">
+            <a:schemeClr val="accent1"/>
+          </a:lnRef>
+          <a:fillRef idx="0">
+            <a:schemeClr val="accent1"/>
+          </a:fillRef>
+          <a:effectRef idx="0">
+            <a:schemeClr val="accent1"/>
+          </a:effectRef>
+          <a:fontRef idx="minor">
+            <a:schemeClr val="tx1"/>
+          </a:fontRef>
+        </p:style>
+      </p:cxnSp>
+      <p:pic>
+        <p:nvPicPr>
+          <p:cNvPr id="1026" name="Picture 2" descr="MongoDB란? - RastaLion IT Blog"/>
+          <p:cNvPicPr>
+            <a:picLocks noChangeAspect="1" noChangeArrowheads="1"/>
+          </p:cNvPicPr>
+          <p:nvPr/>
+        </p:nvPicPr>
+        <p:blipFill>
+          <a:blip r:embed="rId9" cstate="print">
+            <a:extLst>
+              <a:ext uri="{28A0092B-C50C-407E-A947-70E740481C1C}">
+                <a14:useLocalDpi xmlns:a14="http://schemas.microsoft.com/office/drawing/2010/main" val="0"/>
+              </a:ext>
+            </a:extLst>
+          </a:blip>
+          <a:srcRect/>
+          <a:stretch>
+            <a:fillRect/>
+          </a:stretch>
+        </p:blipFill>
+        <p:spPr bwMode="auto">
+          <a:xfrm>
+            <a:off x="7978302" y="3526970"/>
+            <a:ext cx="1241294" cy="1241294"/>
+          </a:xfrm>
+          <a:prstGeom prst="rect">
+            <a:avLst/>
+          </a:prstGeom>
+          <a:noFill/>
+          <a:extLst>
+            <a:ext uri="{909E8E84-426E-40DD-AFC4-6F175D3DCCD1}">
+              <a14:hiddenFill xmlns:a14="http://schemas.microsoft.com/office/drawing/2010/main">
+                <a:solidFill>
+                  <a:srgbClr val="FFFFFF"/>
+                </a:solidFill>
+              </a14:hiddenFill>
+            </a:ext>
+          </a:extLst>
+        </p:spPr>
+      </p:pic>
+      <p:cxnSp>
+        <p:nvCxnSpPr>
+          <p:cNvPr id="35" name="직선 화살표 연결선 34"/>
+          <p:cNvCxnSpPr/>
+          <p:nvPr/>
+        </p:nvCxnSpPr>
+        <p:spPr>
+          <a:xfrm flipV="1">
+            <a:off x="6587079" y="4222787"/>
+            <a:ext cx="1525167" cy="1"/>
+          </a:xfrm>
+          <a:prstGeom prst="straightConnector1">
+            <a:avLst/>
+          </a:prstGeom>
+          <a:ln>
+            <a:solidFill>
+              <a:schemeClr val="tx1"/>
+            </a:solidFill>
             <a:tailEnd type="triangle"/>
           </a:ln>
         </p:spPr>

</xml_diff>